<commit_message>
SW done mpc go
</commit_message>
<xml_diff>
--- a/docs/abbildungen/201603026_Anlage.pptx
+++ b/docs/abbildungen/201603026_Anlage.pptx
@@ -3189,6 +3189,36 @@
           </a:p>
         </p:txBody>
       </p:sp>
+      <p:pic>
+        <p:nvPicPr>
+          <p:cNvPr id="3" name="Bild 2"/>
+          <p:cNvPicPr>
+            <a:picLocks noChangeAspect="1"/>
+          </p:cNvPicPr>
+          <p:nvPr/>
+        </p:nvPicPr>
+        <p:blipFill>
+          <a:blip r:embed="rId2">
+            <a:extLst>
+              <a:ext uri="{28A0092B-C50C-407E-A947-70E740481C1C}">
+                <a14:useLocalDpi xmlns:a14="http://schemas.microsoft.com/office/drawing/2010/main" val="0"/>
+              </a:ext>
+            </a:extLst>
+          </a:blip>
+          <a:stretch>
+            <a:fillRect/>
+          </a:stretch>
+        </p:blipFill>
+        <p:spPr>
+          <a:xfrm>
+            <a:off x="2795405" y="0"/>
+            <a:ext cx="5692140" cy="6858000"/>
+          </a:xfrm>
+          <a:prstGeom prst="rect">
+            <a:avLst/>
+          </a:prstGeom>
+        </p:spPr>
+      </p:pic>
     </p:spTree>
     <p:extLst>
       <p:ext uri="{BB962C8B-B14F-4D97-AF65-F5344CB8AC3E}">

</xml_diff>

<commit_message>
mpc done, model to go
</commit_message>
<xml_diff>
--- a/docs/abbildungen/201603026_Anlage.pptx
+++ b/docs/abbildungen/201603026_Anlage.pptx
@@ -3189,36 +3189,6 @@
           </a:p>
         </p:txBody>
       </p:sp>
-      <p:pic>
-        <p:nvPicPr>
-          <p:cNvPr id="3" name="Bild 2"/>
-          <p:cNvPicPr>
-            <a:picLocks noChangeAspect="1"/>
-          </p:cNvPicPr>
-          <p:nvPr/>
-        </p:nvPicPr>
-        <p:blipFill>
-          <a:blip r:embed="rId2">
-            <a:extLst>
-              <a:ext uri="{28A0092B-C50C-407E-A947-70E740481C1C}">
-                <a14:useLocalDpi xmlns:a14="http://schemas.microsoft.com/office/drawing/2010/main" val="0"/>
-              </a:ext>
-            </a:extLst>
-          </a:blip>
-          <a:stretch>
-            <a:fillRect/>
-          </a:stretch>
-        </p:blipFill>
-        <p:spPr>
-          <a:xfrm>
-            <a:off x="2795405" y="0"/>
-            <a:ext cx="5692140" cy="6858000"/>
-          </a:xfrm>
-          <a:prstGeom prst="rect">
-            <a:avLst/>
-          </a:prstGeom>
-        </p:spPr>
-      </p:pic>
     </p:spTree>
     <p:extLst>
       <p:ext uri="{BB962C8B-B14F-4D97-AF65-F5344CB8AC3E}">

</xml_diff>

<commit_message>
anhang done, anlage improved
</commit_message>
<xml_diff>
--- a/docs/abbildungen/201603026_Anlage.pptx
+++ b/docs/abbildungen/201603026_Anlage.pptx
@@ -201,7 +201,7 @@
           <a:p>
             <a:fld id="{5753CF93-5E45-3941-8549-3B143DEE3F14}" type="datetimeFigureOut">
               <a:rPr lang="de-DE" smtClean="0"/>
-              <a:t>30.03.16</a:t>
+              <a:t>31.03.16</a:t>
             </a:fld>
             <a:endParaRPr lang="de-DE"/>
           </a:p>
@@ -415,7 +415,7 @@
           <a:p>
             <a:fld id="{CAD28D52-5B67-8840-9FB3-766E3199C55A}" type="datetimeFigureOut">
               <a:rPr lang="de-DE" smtClean="0"/>
-              <a:t>30.03.16</a:t>
+              <a:t>31.03.16</a:t>
             </a:fld>
             <a:endParaRPr lang="de-DE"/>
           </a:p>
@@ -585,7 +585,7 @@
           <a:p>
             <a:fld id="{CAD28D52-5B67-8840-9FB3-766E3199C55A}" type="datetimeFigureOut">
               <a:rPr lang="de-DE" smtClean="0"/>
-              <a:t>30.03.16</a:t>
+              <a:t>31.03.16</a:t>
             </a:fld>
             <a:endParaRPr lang="de-DE"/>
           </a:p>
@@ -765,7 +765,7 @@
           <a:p>
             <a:fld id="{CAD28D52-5B67-8840-9FB3-766E3199C55A}" type="datetimeFigureOut">
               <a:rPr lang="de-DE" smtClean="0"/>
-              <a:t>30.03.16</a:t>
+              <a:t>31.03.16</a:t>
             </a:fld>
             <a:endParaRPr lang="de-DE"/>
           </a:p>
@@ -935,7 +935,7 @@
           <a:p>
             <a:fld id="{CAD28D52-5B67-8840-9FB3-766E3199C55A}" type="datetimeFigureOut">
               <a:rPr lang="de-DE" smtClean="0"/>
-              <a:t>30.03.16</a:t>
+              <a:t>31.03.16</a:t>
             </a:fld>
             <a:endParaRPr lang="de-DE"/>
           </a:p>
@@ -1181,7 +1181,7 @@
           <a:p>
             <a:fld id="{CAD28D52-5B67-8840-9FB3-766E3199C55A}" type="datetimeFigureOut">
               <a:rPr lang="de-DE" smtClean="0"/>
-              <a:t>30.03.16</a:t>
+              <a:t>31.03.16</a:t>
             </a:fld>
             <a:endParaRPr lang="de-DE"/>
           </a:p>
@@ -1413,7 +1413,7 @@
           <a:p>
             <a:fld id="{CAD28D52-5B67-8840-9FB3-766E3199C55A}" type="datetimeFigureOut">
               <a:rPr lang="de-DE" smtClean="0"/>
-              <a:t>30.03.16</a:t>
+              <a:t>31.03.16</a:t>
             </a:fld>
             <a:endParaRPr lang="de-DE"/>
           </a:p>
@@ -1780,7 +1780,7 @@
           <a:p>
             <a:fld id="{CAD28D52-5B67-8840-9FB3-766E3199C55A}" type="datetimeFigureOut">
               <a:rPr lang="de-DE" smtClean="0"/>
-              <a:t>30.03.16</a:t>
+              <a:t>31.03.16</a:t>
             </a:fld>
             <a:endParaRPr lang="de-DE"/>
           </a:p>
@@ -1898,7 +1898,7 @@
           <a:p>
             <a:fld id="{CAD28D52-5B67-8840-9FB3-766E3199C55A}" type="datetimeFigureOut">
               <a:rPr lang="de-DE" smtClean="0"/>
-              <a:t>30.03.16</a:t>
+              <a:t>31.03.16</a:t>
             </a:fld>
             <a:endParaRPr lang="de-DE"/>
           </a:p>
@@ -1993,7 +1993,7 @@
           <a:p>
             <a:fld id="{CAD28D52-5B67-8840-9FB3-766E3199C55A}" type="datetimeFigureOut">
               <a:rPr lang="de-DE" smtClean="0"/>
-              <a:t>30.03.16</a:t>
+              <a:t>31.03.16</a:t>
             </a:fld>
             <a:endParaRPr lang="de-DE"/>
           </a:p>
@@ -2270,7 +2270,7 @@
           <a:p>
             <a:fld id="{CAD28D52-5B67-8840-9FB3-766E3199C55A}" type="datetimeFigureOut">
               <a:rPr lang="de-DE" smtClean="0"/>
-              <a:t>30.03.16</a:t>
+              <a:t>31.03.16</a:t>
             </a:fld>
             <a:endParaRPr lang="de-DE"/>
           </a:p>
@@ -2523,7 +2523,7 @@
           <a:p>
             <a:fld id="{CAD28D52-5B67-8840-9FB3-766E3199C55A}" type="datetimeFigureOut">
               <a:rPr lang="de-DE" smtClean="0"/>
-              <a:t>30.03.16</a:t>
+              <a:t>31.03.16</a:t>
             </a:fld>
             <a:endParaRPr lang="de-DE"/>
           </a:p>
@@ -2736,7 +2736,7 @@
           <a:p>
             <a:fld id="{CAD28D52-5B67-8840-9FB3-766E3199C55A}" type="datetimeFigureOut">
               <a:rPr lang="de-DE" smtClean="0"/>
-              <a:t>30.03.16</a:t>
+              <a:t>31.03.16</a:t>
             </a:fld>
             <a:endParaRPr lang="de-DE"/>
           </a:p>
@@ -11094,30 +11094,6 @@
           </a:fontRef>
         </p:style>
       </p:cxnSp>
-      <p:pic>
-        <p:nvPicPr>
-          <p:cNvPr id="64" name="Bild 63"/>
-          <p:cNvPicPr>
-            <a:picLocks noChangeAspect="1"/>
-          </p:cNvPicPr>
-          <p:nvPr/>
-        </p:nvPicPr>
-        <p:blipFill>
-          <a:blip r:embed="rId7"/>
-          <a:stretch>
-            <a:fillRect/>
-          </a:stretch>
-        </p:blipFill>
-        <p:spPr>
-          <a:xfrm>
-            <a:off x="1587500" y="254000"/>
-            <a:ext cx="9017000" cy="6350000"/>
-          </a:xfrm>
-          <a:prstGeom prst="rect">
-            <a:avLst/>
-          </a:prstGeom>
-        </p:spPr>
-      </p:pic>
     </p:spTree>
     <p:extLst>
       <p:ext uri="{BB962C8B-B14F-4D97-AF65-F5344CB8AC3E}">

</xml_diff>